<commit_message>
Edits from practice read (03.23.22).
</commit_message>
<xml_diff>
--- a/presentations/02_lstm_gru.pptx
+++ b/presentations/02_lstm_gru.pptx
@@ -5,7 +5,7 @@
     <p:sldMasterId id="2147483648" r:id="rId1"/>
   </p:sldMasterIdLst>
   <p:notesMasterIdLst>
-    <p:notesMasterId r:id="rId15"/>
+    <p:notesMasterId r:id="rId16"/>
   </p:notesMasterIdLst>
   <p:sldIdLst>
     <p:sldId id="257" r:id="rId2"/>
@@ -14,13 +14,14 @@
     <p:sldId id="319" r:id="rId5"/>
     <p:sldId id="313" r:id="rId6"/>
     <p:sldId id="322" r:id="rId7"/>
-    <p:sldId id="314" r:id="rId8"/>
-    <p:sldId id="323" r:id="rId9"/>
-    <p:sldId id="324" r:id="rId10"/>
-    <p:sldId id="320" r:id="rId11"/>
+    <p:sldId id="325" r:id="rId8"/>
+    <p:sldId id="314" r:id="rId9"/>
+    <p:sldId id="323" r:id="rId10"/>
+    <p:sldId id="324" r:id="rId11"/>
     <p:sldId id="317" r:id="rId12"/>
-    <p:sldId id="321" r:id="rId13"/>
-    <p:sldId id="315" r:id="rId14"/>
+    <p:sldId id="320" r:id="rId13"/>
+    <p:sldId id="321" r:id="rId14"/>
+    <p:sldId id="315" r:id="rId15"/>
   </p:sldIdLst>
   <p:sldSz cx="12192000" cy="6858000"/>
   <p:notesSz cx="7077075" cy="9363075"/>
@@ -220,7 +221,7 @@
           <a:p>
             <a:fld id="{FD93C9B2-20F6-4DB1-B471-224337D0AC79}" type="datetimeFigureOut">
               <a:rPr lang="en-US" smtClean="0"/>
-              <a:t>3/16/2022</a:t>
+              <a:t>3/23/2022</a:t>
             </a:fld>
             <a:endParaRPr lang="en-US"/>
           </a:p>
@@ -625,7 +626,15 @@
             <a:pPr algn="l"/>
             <a:r>
               <a:rPr lang="en-US" dirty="0"/>
-              <a:t>Our exercises this week come from Chapter 6.  I like what the text does in this chapter as it walks you through a series of exercises where you can compare / contrast different kinds of advanced RNNs.  But before we cut you loose, I’d like to highlight a few key points from the text.  </a:t>
+              <a:t>We can stack up lots of bi-RNNs to create a </a:t>
+            </a:r>
+            <a:r>
+              <a:rPr lang="en-US" b="1" dirty="0"/>
+              <a:t>stacked LSTM</a:t>
+            </a:r>
+            <a:r>
+              <a:rPr lang="en-US" dirty="0"/>
+              <a:t>.   The network with three bi-RNN layers. On the left is our schematic for this layer, and on the right, we draw each layer in its unrolled form. In this diagram, we have three layers, each containing two independent recurrent cells.</a:t>
             </a:r>
           </a:p>
           <a:p>
@@ -635,183 +644,9 @@
           <a:p>
             <a:pPr algn="l"/>
             <a:r>
-              <a:rPr lang="en-US" b="1" dirty="0"/>
-              <a:t>Building the Plain RNN Model </a:t>
-            </a:r>
-            <a:r>
               <a:rPr lang="en-US" dirty="0"/>
-              <a:t>(p.  275)</a:t>
-            </a:r>
-          </a:p>
-          <a:p>
-            <a:pPr algn="l"/>
-            <a:endParaRPr lang="en-US" dirty="0"/>
-          </a:p>
-          <a:p>
-            <a:pPr algn="l"/>
-            <a:r>
-              <a:rPr lang="en-US" b="1" dirty="0"/>
-              <a:t>LSTM-Based Sentiment Classification Model </a:t>
-            </a:r>
-            <a:r>
-              <a:rPr lang="en-US" dirty="0"/>
-              <a:t>(p. 288).</a:t>
-            </a:r>
-          </a:p>
-          <a:p>
-            <a:pPr algn="l"/>
-            <a:endParaRPr lang="en-US" dirty="0"/>
-          </a:p>
-          <a:p>
-            <a:pPr algn="l"/>
-            <a:r>
-              <a:rPr lang="en-US" i="1" dirty="0"/>
-              <a:t>Benefits of LSTMs:</a:t>
-            </a:r>
-          </a:p>
-          <a:p>
-            <a:pPr algn="l"/>
-            <a:r>
-              <a:rPr lang="en-US" dirty="0"/>
-              <a:t>• More powerful, as it uses more parameters and an explicit cell state</a:t>
-            </a:r>
-          </a:p>
-          <a:p>
-            <a:pPr algn="l"/>
-            <a:r>
-              <a:rPr lang="en-US" dirty="0"/>
-              <a:t>• Models long-range dependencies better</a:t>
-            </a:r>
-          </a:p>
-          <a:p>
-            <a:pPr algn="l"/>
-            <a:endParaRPr lang="en-US" dirty="0"/>
-          </a:p>
-          <a:p>
-            <a:pPr algn="l"/>
-            <a:r>
-              <a:rPr lang="en-US" i="1" dirty="0">
-                <a:effectLst>
-                  <a:outerShdw blurRad="38100" dist="38100" dir="2700000" algn="tl">
-                    <a:srgbClr val="000000">
-                      <a:alpha val="43137"/>
-                    </a:srgbClr>
-                  </a:outerShdw>
-                </a:effectLst>
-              </a:rPr>
-              <a:t>Drawbacks of LSTMs:</a:t>
-            </a:r>
-          </a:p>
-          <a:p>
-            <a:pPr algn="l"/>
-            <a:r>
-              <a:rPr lang="en-US" dirty="0"/>
-              <a:t>• Many more parameters</a:t>
-            </a:r>
-          </a:p>
-          <a:p>
-            <a:pPr algn="l"/>
-            <a:r>
-              <a:rPr lang="en-US" dirty="0"/>
-              <a:t>• Takes more time to train</a:t>
-            </a:r>
-          </a:p>
-          <a:p>
-            <a:pPr algn="l"/>
-            <a:r>
-              <a:rPr lang="en-US" dirty="0"/>
-              <a:t>• More prone to overfitting</a:t>
-            </a:r>
-          </a:p>
-          <a:p>
-            <a:pPr algn="l"/>
-            <a:endParaRPr lang="en-US" dirty="0"/>
-          </a:p>
-          <a:p>
-            <a:pPr algn="l"/>
-            <a:r>
-              <a:rPr lang="en-US" b="1" dirty="0"/>
-              <a:t>GRU-Based Sentiment Classification Model </a:t>
-            </a:r>
-            <a:r>
-              <a:rPr lang="en-US" dirty="0"/>
-              <a:t>(p. 294)</a:t>
-            </a:r>
-          </a:p>
-          <a:p>
-            <a:pPr algn="l"/>
-            <a:endParaRPr lang="en-US" dirty="0"/>
-          </a:p>
-          <a:p>
-            <a:pPr algn="l"/>
-            <a:r>
-              <a:rPr lang="en-US" dirty="0"/>
-              <a:t>Between the LSTM and GRU, which one should you choose? The LSTM has more parameters and an explicit cell state designed to store long-term memory. But the GRU has fewer parameters, which means faster training, combined with a free-flowing cell state to allow it to model long-range dependencies.</a:t>
-            </a:r>
-          </a:p>
-          <a:p>
-            <a:pPr algn="l"/>
-            <a:endParaRPr lang="en-US" dirty="0"/>
-          </a:p>
-          <a:p>
-            <a:pPr algn="l"/>
-            <a:r>
-              <a:rPr lang="en-US" b="1" dirty="0"/>
-              <a:t>Bidirectional LSTM-Based Sentiment Classification Model</a:t>
-            </a:r>
-            <a:r>
-              <a:rPr lang="en-US" dirty="0"/>
-              <a:t> (p. 299)</a:t>
-            </a:r>
-          </a:p>
-          <a:p>
-            <a:pPr algn="l"/>
-            <a:r>
-              <a:rPr lang="en-US" dirty="0"/>
-              <a:t>Bidirectional RNNs process the sequence in both directions, allowing the network to have both backward and forward information about the sequence, providing it with a much richer context.</a:t>
-            </a:r>
-          </a:p>
-          <a:p>
-            <a:pPr algn="l"/>
-            <a:endParaRPr lang="en-US" dirty="0"/>
-          </a:p>
-          <a:p>
-            <a:pPr algn="l"/>
-            <a:r>
-              <a:rPr lang="en-US" b="1" dirty="0"/>
-              <a:t>Stacked LSTM-Based Sentiment Classification Model</a:t>
-            </a:r>
-            <a:r>
-              <a:rPr lang="en-US" dirty="0"/>
-              <a:t> (p. 302)</a:t>
-            </a:r>
-          </a:p>
-          <a:p>
-            <a:pPr algn="l"/>
-            <a:r>
-              <a:rPr lang="en-US" dirty="0"/>
-              <a:t>In all the models we've looked at in this chapter, we've used a single layer for the RNN layer (plain RNN, LSTM, or GRU). Going deeper, that is, adding more layers, has typically helped us for feedforward networks so that we can learn more complex patterns/features in the deeper layers.</a:t>
-            </a:r>
-          </a:p>
-          <a:p>
-            <a:pPr algn="l"/>
-            <a:endParaRPr lang="en-US" dirty="0"/>
-          </a:p>
-          <a:p>
-            <a:pPr algn="l"/>
-            <a:endParaRPr lang="en-US" dirty="0"/>
-          </a:p>
-          <a:p>
-            <a:pPr algn="l"/>
-            <a:endParaRPr lang="en-US" dirty="0"/>
-          </a:p>
-          <a:p>
-            <a:pPr algn="l"/>
-            <a:endParaRPr lang="en-US" dirty="0"/>
-          </a:p>
-          <a:p>
-            <a:pPr algn="l"/>
-            <a:endParaRPr lang="en-US" dirty="0"/>
+              <a:t>As before, part of the value here is that each bi-RNN can be independently trained for a different task, and a new bi-RNN can be swapped in if we find (or train) another one that performs better.</a:t>
+            </a:r>
           </a:p>
         </p:txBody>
       </p:sp>
@@ -841,7 +676,7 @@
     </p:spTree>
     <p:extLst>
       <p:ext uri="{BB962C8B-B14F-4D97-AF65-F5344CB8AC3E}">
-        <p14:creationId xmlns:p14="http://schemas.microsoft.com/office/powerpoint/2010/main" val="2806771018"/>
+        <p14:creationId xmlns:p14="http://schemas.microsoft.com/office/powerpoint/2010/main" val="1181874914"/>
       </p:ext>
     </p:extLst>
   </p:cSld>
@@ -980,6 +815,194 @@
           <a:lstStyle/>
           <a:p>
             <a:pPr algn="l"/>
+            <a:r>
+              <a:rPr lang="en-US" dirty="0"/>
+              <a:t>So, let’s quickly review what we learned in our exercise.  I liked this exercise as it walks you through a series of exercises where you can compare / contrast different kinds of advanced RNNs.  But before we cut you loose, I’d like to highlight a few key points from the text.  </a:t>
+            </a:r>
+          </a:p>
+          <a:p>
+            <a:pPr algn="l"/>
+            <a:endParaRPr lang="en-US" dirty="0"/>
+          </a:p>
+          <a:p>
+            <a:pPr algn="l"/>
+            <a:r>
+              <a:rPr lang="en-US" b="1" dirty="0"/>
+              <a:t>Building the Plain RNN Model </a:t>
+            </a:r>
+            <a:r>
+              <a:rPr lang="en-US" dirty="0"/>
+              <a:t>(p.  275)</a:t>
+            </a:r>
+          </a:p>
+          <a:p>
+            <a:pPr algn="l"/>
+            <a:endParaRPr lang="en-US" dirty="0"/>
+          </a:p>
+          <a:p>
+            <a:pPr algn="l"/>
+            <a:r>
+              <a:rPr lang="en-US" b="1" dirty="0"/>
+              <a:t>LSTM-Based Sentiment Classification Model </a:t>
+            </a:r>
+            <a:r>
+              <a:rPr lang="en-US" dirty="0"/>
+              <a:t>(p. 288).</a:t>
+            </a:r>
+          </a:p>
+          <a:p>
+            <a:pPr algn="l"/>
+            <a:endParaRPr lang="en-US" dirty="0"/>
+          </a:p>
+          <a:p>
+            <a:pPr algn="l"/>
+            <a:r>
+              <a:rPr lang="en-US" i="1" dirty="0"/>
+              <a:t>Benefits of LSTMs:</a:t>
+            </a:r>
+          </a:p>
+          <a:p>
+            <a:pPr algn="l"/>
+            <a:r>
+              <a:rPr lang="en-US" dirty="0"/>
+              <a:t>• More powerful, as it uses more parameters and an explicit cell state</a:t>
+            </a:r>
+          </a:p>
+          <a:p>
+            <a:pPr algn="l"/>
+            <a:r>
+              <a:rPr lang="en-US" dirty="0"/>
+              <a:t>• Models long-range dependencies better</a:t>
+            </a:r>
+          </a:p>
+          <a:p>
+            <a:pPr algn="l"/>
+            <a:endParaRPr lang="en-US" dirty="0"/>
+          </a:p>
+          <a:p>
+            <a:pPr algn="l"/>
+            <a:r>
+              <a:rPr lang="en-US" i="1" dirty="0">
+                <a:effectLst>
+                  <a:outerShdw blurRad="38100" dist="38100" dir="2700000" algn="tl">
+                    <a:srgbClr val="000000">
+                      <a:alpha val="43137"/>
+                    </a:srgbClr>
+                  </a:outerShdw>
+                </a:effectLst>
+              </a:rPr>
+              <a:t>Drawbacks of LSTMs:</a:t>
+            </a:r>
+          </a:p>
+          <a:p>
+            <a:pPr algn="l"/>
+            <a:r>
+              <a:rPr lang="en-US" dirty="0"/>
+              <a:t>• Many more parameters</a:t>
+            </a:r>
+          </a:p>
+          <a:p>
+            <a:pPr algn="l"/>
+            <a:r>
+              <a:rPr lang="en-US" dirty="0"/>
+              <a:t>• Takes more time to train</a:t>
+            </a:r>
+          </a:p>
+          <a:p>
+            <a:pPr algn="l"/>
+            <a:r>
+              <a:rPr lang="en-US" dirty="0"/>
+              <a:t>• More prone to overfitting</a:t>
+            </a:r>
+          </a:p>
+          <a:p>
+            <a:pPr algn="l"/>
+            <a:endParaRPr lang="en-US" dirty="0"/>
+          </a:p>
+          <a:p>
+            <a:pPr algn="l"/>
+            <a:r>
+              <a:rPr lang="en-US" b="1" dirty="0"/>
+              <a:t>GRU-Based Sentiment Classification Model </a:t>
+            </a:r>
+            <a:r>
+              <a:rPr lang="en-US" dirty="0"/>
+              <a:t>(p. 294)</a:t>
+            </a:r>
+          </a:p>
+          <a:p>
+            <a:pPr algn="l"/>
+            <a:endParaRPr lang="en-US" dirty="0"/>
+          </a:p>
+          <a:p>
+            <a:pPr algn="l"/>
+            <a:r>
+              <a:rPr lang="en-US" dirty="0"/>
+              <a:t>Between the LSTM and GRU, which one should you choose? The LSTM has more parameters and an explicit cell state designed to store long-term memory. But the GRU has fewer parameters, which means faster training, combined with a free-flowing cell state to allow it to model long-range dependencies.</a:t>
+            </a:r>
+          </a:p>
+          <a:p>
+            <a:pPr algn="l"/>
+            <a:endParaRPr lang="en-US" dirty="0"/>
+          </a:p>
+          <a:p>
+            <a:pPr algn="l"/>
+            <a:r>
+              <a:rPr lang="en-US" b="1" dirty="0"/>
+              <a:t>Bidirectional LSTM-Based Sentiment Classification Model</a:t>
+            </a:r>
+            <a:r>
+              <a:rPr lang="en-US" dirty="0"/>
+              <a:t> (p. 299)</a:t>
+            </a:r>
+          </a:p>
+          <a:p>
+            <a:pPr algn="l"/>
+            <a:r>
+              <a:rPr lang="en-US" dirty="0"/>
+              <a:t>Bidirectional RNNs process the sequence in both directions, allowing the network to have both backward and forward information about the sequence, providing it with a much richer context.</a:t>
+            </a:r>
+          </a:p>
+          <a:p>
+            <a:pPr algn="l"/>
+            <a:endParaRPr lang="en-US" dirty="0"/>
+          </a:p>
+          <a:p>
+            <a:pPr algn="l"/>
+            <a:r>
+              <a:rPr lang="en-US" b="1" dirty="0"/>
+              <a:t>Stacked LSTM-Based Sentiment Classification Model</a:t>
+            </a:r>
+            <a:r>
+              <a:rPr lang="en-US" dirty="0"/>
+              <a:t> (p. 302)</a:t>
+            </a:r>
+          </a:p>
+          <a:p>
+            <a:pPr algn="l"/>
+            <a:r>
+              <a:rPr lang="en-US" dirty="0"/>
+              <a:t>In all the models we've looked at in this chapter, we've used a single layer for the RNN layer (plain RNN, LSTM, or GRU). Going deeper, that is, adding more layers, has typically helped us for feedforward networks so that we can learn more complex patterns/features in the deeper layers.</a:t>
+            </a:r>
+          </a:p>
+          <a:p>
+            <a:pPr algn="l"/>
+            <a:endParaRPr lang="en-US" dirty="0"/>
+          </a:p>
+          <a:p>
+            <a:pPr algn="l"/>
+            <a:endParaRPr lang="en-US" dirty="0"/>
+          </a:p>
+          <a:p>
+            <a:pPr algn="l"/>
+            <a:endParaRPr lang="en-US" dirty="0"/>
+          </a:p>
+          <a:p>
+            <a:pPr algn="l"/>
+            <a:endParaRPr lang="en-US" dirty="0"/>
+          </a:p>
+          <a:p>
+            <a:pPr algn="l"/>
             <a:endParaRPr lang="en-US" dirty="0"/>
           </a:p>
         </p:txBody>
@@ -1010,7 +1033,7 @@
     </p:spTree>
     <p:extLst>
       <p:ext uri="{BB962C8B-B14F-4D97-AF65-F5344CB8AC3E}">
-        <p14:creationId xmlns:p14="http://schemas.microsoft.com/office/powerpoint/2010/main" val="2761642810"/>
+        <p14:creationId xmlns:p14="http://schemas.microsoft.com/office/powerpoint/2010/main" val="2806771018"/>
       </p:ext>
     </p:extLst>
   </p:cSld>
@@ -1064,6 +1087,91 @@
           <a:bodyPr/>
           <a:lstStyle/>
           <a:p>
+            <a:pPr algn="l"/>
+            <a:endParaRPr lang="en-US" dirty="0"/>
+          </a:p>
+        </p:txBody>
+      </p:sp>
+      <p:sp>
+        <p:nvSpPr>
+          <p:cNvPr id="4" name="Slide Number Placeholder 3"/>
+          <p:cNvSpPr>
+            <a:spLocks noGrp="1"/>
+          </p:cNvSpPr>
+          <p:nvPr>
+            <p:ph type="sldNum" sz="quarter" idx="5"/>
+          </p:nvPr>
+        </p:nvSpPr>
+        <p:spPr/>
+        <p:txBody>
+          <a:bodyPr/>
+          <a:lstStyle/>
+          <a:p>
+            <a:fld id="{3148858F-F1DB-4027-9C85-CCA6849540DD}" type="slidenum">
+              <a:rPr lang="en-US" smtClean="0"/>
+              <a:t>13</a:t>
+            </a:fld>
+            <a:endParaRPr lang="en-US"/>
+          </a:p>
+        </p:txBody>
+      </p:sp>
+    </p:spTree>
+    <p:extLst>
+      <p:ext uri="{BB962C8B-B14F-4D97-AF65-F5344CB8AC3E}">
+        <p14:creationId xmlns:p14="http://schemas.microsoft.com/office/powerpoint/2010/main" val="2761642810"/>
+      </p:ext>
+    </p:extLst>
+  </p:cSld>
+  <p:clrMapOvr>
+    <a:masterClrMapping/>
+  </p:clrMapOvr>
+</p:notes>
+</file>
+
+<file path=ppt/notesSlides/notesSlide14.xml><?xml version="1.0" encoding="utf-8"?>
+<p:notes xmlns:a="http://schemas.openxmlformats.org/drawingml/2006/main" xmlns:r="http://schemas.openxmlformats.org/officeDocument/2006/relationships" xmlns:p="http://schemas.openxmlformats.org/presentationml/2006/main">
+  <p:cSld>
+    <p:spTree>
+      <p:nvGrpSpPr>
+        <p:cNvPr id="1" name=""/>
+        <p:cNvGrpSpPr/>
+        <p:nvPr/>
+      </p:nvGrpSpPr>
+      <p:grpSpPr>
+        <a:xfrm>
+          <a:off x="0" y="0"/>
+          <a:ext cx="0" cy="0"/>
+          <a:chOff x="0" y="0"/>
+          <a:chExt cx="0" cy="0"/>
+        </a:xfrm>
+      </p:grpSpPr>
+      <p:sp>
+        <p:nvSpPr>
+          <p:cNvPr id="2" name="Slide Image Placeholder 1"/>
+          <p:cNvSpPr>
+            <a:spLocks noGrp="1" noRot="1" noChangeAspect="1"/>
+          </p:cNvSpPr>
+          <p:nvPr>
+            <p:ph type="sldImg"/>
+          </p:nvPr>
+        </p:nvSpPr>
+        <p:spPr/>
+      </p:sp>
+      <p:sp>
+        <p:nvSpPr>
+          <p:cNvPr id="3" name="Notes Placeholder 2"/>
+          <p:cNvSpPr>
+            <a:spLocks noGrp="1"/>
+          </p:cNvSpPr>
+          <p:nvPr>
+            <p:ph type="body" idx="1"/>
+          </p:nvPr>
+        </p:nvSpPr>
+        <p:spPr/>
+        <p:txBody>
+          <a:bodyPr/>
+          <a:lstStyle/>
+          <a:p>
             <a:pPr defTabSz="939363">
               <a:defRPr/>
             </a:pPr>
@@ -1210,7 +1318,7 @@
           <a:p>
             <a:fld id="{3148858F-F1DB-4027-9C85-CCA6849540DD}" type="slidenum">
               <a:rPr lang="en-US" smtClean="0"/>
-              <a:t>13</a:t>
+              <a:t>14</a:t>
             </a:fld>
             <a:endParaRPr lang="en-US"/>
           </a:p>
@@ -1277,7 +1385,7 @@
               <a:rPr lang="en-US" dirty="0">
                 <a:latin typeface="+mn-lt"/>
               </a:rPr>
-              <a:t>So, if we have a sentence like “Today has a beautiful blue &lt;something&gt;,” the word “blue” will have a strong impact on the next word; we can guess that it’s likely to be “sky.” But what about context that comes from further back in a sentence? For example, consider this sentence: “I lived in Ireland, so in high school I had to learn how to speak and write &lt;something&gt;.</a:t>
+              <a:t>To contextualize today’s mini-lecture, let’s first consider a sentence like: “Today has a beautiful blue &lt;something&gt;,” the word “blue” will have a strong impact on the next word; we can guess that it’s likely to be “sky.” But what about context that comes from further back in a sentence? </a:t>
             </a:r>
           </a:p>
           <a:p>
@@ -1286,6 +1394,12 @@
             </a:endParaRPr>
           </a:p>
           <a:p>
+            <a:r>
+              <a:rPr lang="en-US" dirty="0">
+                <a:latin typeface="+mn-lt"/>
+              </a:rPr>
+              <a:t>For example, consider this sentence: “I lived in Ireland, so in high school I had to learn how to speak and write &lt;something&gt;.  </a:t>
+            </a:r>
             <a:r>
               <a:rPr lang="en-US" b="0" i="0" dirty="0">
                 <a:solidFill>
@@ -1854,100 +1968,14 @@
           <a:bodyPr/>
           <a:lstStyle/>
           <a:p>
-            <a:r>
-              <a:rPr lang="en-US" b="0" i="0" dirty="0">
-                <a:solidFill>
-                  <a:srgbClr val="3D3B49"/>
-                </a:solidFill>
-                <a:effectLst/>
-                <a:latin typeface="+mn-lt"/>
-              </a:rPr>
-              <a:t>RNN’s can also be bidirectional—the time steps iterate both forward and backward, so that context can be learned in both directions, as pictured here.</a:t>
-            </a:r>
-          </a:p>
-          <a:p>
-            <a:endParaRPr lang="en-US" b="0" i="0" dirty="0">
-              <a:solidFill>
-                <a:srgbClr val="3D3B49"/>
-              </a:solidFill>
-              <a:effectLst/>
-              <a:latin typeface="+mn-lt"/>
-            </a:endParaRPr>
-          </a:p>
-          <a:p>
-            <a:r>
-              <a:rPr lang="en-US" b="0" i="0" dirty="0">
-                <a:solidFill>
-                  <a:srgbClr val="3D3B49"/>
-                </a:solidFill>
-                <a:effectLst/>
-                <a:latin typeface="+mn-lt"/>
-              </a:rPr>
-              <a:t>In this way, evaluation in the direction from 0 to </a:t>
-            </a:r>
-            <a:r>
-              <a:rPr lang="en-US" b="0" i="1" dirty="0">
-                <a:solidFill>
-                  <a:srgbClr val="3D3B49"/>
-                </a:solidFill>
-                <a:effectLst/>
-                <a:latin typeface="+mn-lt"/>
-              </a:rPr>
-              <a:t>number_of_steps</a:t>
-            </a:r>
-            <a:r>
-              <a:rPr lang="en-US" b="0" i="0" dirty="0">
-                <a:solidFill>
-                  <a:srgbClr val="3D3B49"/>
-                </a:solidFill>
-                <a:effectLst/>
-                <a:latin typeface="+mn-lt"/>
-              </a:rPr>
-              <a:t> is done, as is evaluation from </a:t>
-            </a:r>
-            <a:r>
-              <a:rPr lang="en-US" b="0" i="1" dirty="0">
-                <a:solidFill>
-                  <a:srgbClr val="3D3B49"/>
-                </a:solidFill>
-                <a:effectLst/>
-                <a:latin typeface="+mn-lt"/>
-              </a:rPr>
-              <a:t>number_of_steps</a:t>
-            </a:r>
-            <a:r>
-              <a:rPr lang="en-US" b="0" i="0" dirty="0">
-                <a:solidFill>
-                  <a:srgbClr val="3D3B49"/>
-                </a:solidFill>
-                <a:effectLst/>
-                <a:latin typeface="+mn-lt"/>
-              </a:rPr>
-              <a:t> to 0. At each step, the </a:t>
-            </a:r>
-            <a:r>
-              <a:rPr lang="en-US" b="0" i="1" dirty="0">
-                <a:solidFill>
-                  <a:srgbClr val="3D3B49"/>
-                </a:solidFill>
-                <a:effectLst/>
-                <a:latin typeface="+mn-lt"/>
-              </a:rPr>
-              <a:t>y</a:t>
-            </a:r>
-            <a:r>
-              <a:rPr lang="en-US" b="0" i="0" dirty="0">
-                <a:solidFill>
-                  <a:srgbClr val="3D3B49"/>
-                </a:solidFill>
-                <a:effectLst/>
-                <a:latin typeface="+mn-lt"/>
-              </a:rPr>
-              <a:t> result is an aggregation of the “forward” pass as well as the “backward” pass.  </a:t>
-            </a:r>
-            <a:endParaRPr lang="en-US" dirty="0">
-              <a:latin typeface="+mn-lt"/>
-            </a:endParaRPr>
+            <a:pPr algn="l"/>
+            <a:r>
+              <a:rPr lang="en-US" sz="1800" b="0" i="0" u="none" strike="noStrike" baseline="0" dirty="0">
+                <a:latin typeface="OpenSans"/>
+              </a:rPr>
+              <a:t>… and just a quick note about Gated Recurrence Units.  More information is available in the text.  GRUs are simplified forms of LSTMs and aim at reducing the number of parameters while retaining the power of the LSTM. In tasks around speech modeling and language modeling, GRUs provide the same performance as LSTMs, but with fewer parameters and faster training times.</a:t>
+            </a:r>
+            <a:endParaRPr lang="en-US" dirty="0"/>
           </a:p>
         </p:txBody>
       </p:sp>
@@ -1977,7 +2005,7 @@
     </p:spTree>
     <p:extLst>
       <p:ext uri="{BB962C8B-B14F-4D97-AF65-F5344CB8AC3E}">
-        <p14:creationId xmlns:p14="http://schemas.microsoft.com/office/powerpoint/2010/main" val="2050519182"/>
+        <p14:creationId xmlns:p14="http://schemas.microsoft.com/office/powerpoint/2010/main" val="3528352554"/>
       </p:ext>
     </p:extLst>
   </p:cSld>
@@ -2031,15 +2059,100 @@
           <a:bodyPr/>
           <a:lstStyle/>
           <a:p>
-            <a:pPr algn="l"/>
-            <a:r>
-              <a:rPr lang="en-US" dirty="0"/>
-              <a:t>With bi-directional RNN’s, we often feed input – a sentence for example – simultaneously to the lower recurrent cell in forward order and the upper recurrent cell in backward order. That is, we give input 0 to the lower cell at the same time we give input 4 to the upper cell. Then we give input 1 to the lower cell while we give input 3 to the upper cell, and so on. Once all the words have been processed, each recurrent cell will have produced an output for each word. We simply concatenate those outputs and that’s the output of the bi-RNN.</a:t>
-            </a:r>
-          </a:p>
-          <a:p>
-            <a:pPr algn="l"/>
-            <a:endParaRPr lang="en-US" dirty="0"/>
+            <a:r>
+              <a:rPr lang="en-US" b="0" i="0" dirty="0">
+                <a:solidFill>
+                  <a:srgbClr val="3D3B49"/>
+                </a:solidFill>
+                <a:effectLst/>
+                <a:latin typeface="+mn-lt"/>
+              </a:rPr>
+              <a:t>LSTM’s can also be bidirectional—the time steps iterate both forward and backward, so that context can be learned in both directions, as pictured here.</a:t>
+            </a:r>
+          </a:p>
+          <a:p>
+            <a:endParaRPr lang="en-US" b="0" i="0" dirty="0">
+              <a:solidFill>
+                <a:srgbClr val="3D3B49"/>
+              </a:solidFill>
+              <a:effectLst/>
+              <a:latin typeface="+mn-lt"/>
+            </a:endParaRPr>
+          </a:p>
+          <a:p>
+            <a:r>
+              <a:rPr lang="en-US" b="0" i="0" dirty="0">
+                <a:solidFill>
+                  <a:srgbClr val="3D3B49"/>
+                </a:solidFill>
+                <a:effectLst/>
+                <a:latin typeface="+mn-lt"/>
+              </a:rPr>
+              <a:t>In this way, evaluation in the direction from 0 to </a:t>
+            </a:r>
+            <a:r>
+              <a:rPr lang="en-US" b="0" i="1" dirty="0">
+                <a:solidFill>
+                  <a:srgbClr val="3D3B49"/>
+                </a:solidFill>
+                <a:effectLst/>
+                <a:latin typeface="+mn-lt"/>
+              </a:rPr>
+              <a:t>number_of_steps</a:t>
+            </a:r>
+            <a:r>
+              <a:rPr lang="en-US" b="0" i="0" dirty="0">
+                <a:solidFill>
+                  <a:srgbClr val="3D3B49"/>
+                </a:solidFill>
+                <a:effectLst/>
+                <a:latin typeface="+mn-lt"/>
+              </a:rPr>
+              <a:t> is done, as is evaluation from </a:t>
+            </a:r>
+            <a:r>
+              <a:rPr lang="en-US" b="0" i="1" dirty="0">
+                <a:solidFill>
+                  <a:srgbClr val="3D3B49"/>
+                </a:solidFill>
+                <a:effectLst/>
+                <a:latin typeface="+mn-lt"/>
+              </a:rPr>
+              <a:t>number_of_steps</a:t>
+            </a:r>
+            <a:r>
+              <a:rPr lang="en-US" b="0" i="0" dirty="0">
+                <a:solidFill>
+                  <a:srgbClr val="3D3B49"/>
+                </a:solidFill>
+                <a:effectLst/>
+                <a:latin typeface="+mn-lt"/>
+              </a:rPr>
+              <a:t> to 0. At each step, the </a:t>
+            </a:r>
+            <a:r>
+              <a:rPr lang="en-US" b="0" i="1" dirty="0">
+                <a:solidFill>
+                  <a:srgbClr val="3D3B49"/>
+                </a:solidFill>
+                <a:effectLst/>
+                <a:latin typeface="+mn-lt"/>
+              </a:rPr>
+              <a:t>y</a:t>
+            </a:r>
+            <a:r>
+              <a:rPr lang="en-US" b="0" i="0" dirty="0">
+                <a:solidFill>
+                  <a:srgbClr val="3D3B49"/>
+                </a:solidFill>
+                <a:effectLst/>
+                <a:latin typeface="+mn-lt"/>
+              </a:rPr>
+              <a:t> result is an aggregation of the “forward” pass as well as the “backward” pass.  </a:t>
+            </a:r>
+            <a:endParaRPr lang="en-US" dirty="0">
+              <a:latin typeface="+mn-lt"/>
+            </a:endParaRPr>
           </a:p>
         </p:txBody>
       </p:sp>
@@ -2069,7 +2182,7 @@
     </p:spTree>
     <p:extLst>
       <p:ext uri="{BB962C8B-B14F-4D97-AF65-F5344CB8AC3E}">
-        <p14:creationId xmlns:p14="http://schemas.microsoft.com/office/powerpoint/2010/main" val="4264962735"/>
+        <p14:creationId xmlns:p14="http://schemas.microsoft.com/office/powerpoint/2010/main" val="2050519182"/>
       </p:ext>
     </p:extLst>
   </p:cSld>
@@ -2126,19 +2239,12 @@
             <a:pPr algn="l"/>
             <a:r>
               <a:rPr lang="en-US" dirty="0"/>
-              <a:t>We can stack up lots of bi-RNNs to make a deep bi-RNN.   The network with three bi-RNN layers. On the left is our schematic for this layer, and on the right, we draw each layer in its unrolled form. In this diagram, we have three layers, each containing two independent recurrent cells.</a:t>
+              <a:t>With bi-directional RNN’s, we often feed input – a sentence for example – simultaneously to the lower recurrent cell in forward order and the upper recurrent cell in backward order. That is, we give input 0 to the lower cell at the same time we give input 4 to the upper cell. Then we give input 1 to the lower cell while we give input 3 to the upper cell, and so on. Once all the words have been processed, each recurrent cell will have produced an output for each word. We simply concatenate those outputs and that’s the output of the bi-RNN.</a:t>
             </a:r>
           </a:p>
           <a:p>
             <a:pPr algn="l"/>
             <a:endParaRPr lang="en-US" dirty="0"/>
-          </a:p>
-          <a:p>
-            <a:pPr algn="l"/>
-            <a:r>
-              <a:rPr lang="en-US" dirty="0"/>
-              <a:t>As before, part of the value here is that each bi-RNN can be independently trained for a different task, and a new bi-RNN can be swapped in if we find (or train) another one that performs better.</a:t>
-            </a:r>
           </a:p>
         </p:txBody>
       </p:sp>
@@ -2168,7 +2274,7 @@
     </p:spTree>
     <p:extLst>
       <p:ext uri="{BB962C8B-B14F-4D97-AF65-F5344CB8AC3E}">
-        <p14:creationId xmlns:p14="http://schemas.microsoft.com/office/powerpoint/2010/main" val="1181874914"/>
+        <p14:creationId xmlns:p14="http://schemas.microsoft.com/office/powerpoint/2010/main" val="4264962735"/>
       </p:ext>
     </p:extLst>
   </p:cSld>
@@ -2325,7 +2431,7 @@
           <a:p>
             <a:fld id="{C3F78080-8D0A-4BE8-A5B4-CB115102D524}" type="datetimeFigureOut">
               <a:rPr lang="en-US" smtClean="0"/>
-              <a:t>3/16/2022</a:t>
+              <a:t>3/23/2022</a:t>
             </a:fld>
             <a:endParaRPr lang="en-US"/>
           </a:p>
@@ -2523,7 +2629,7 @@
           <a:p>
             <a:fld id="{C3F78080-8D0A-4BE8-A5B4-CB115102D524}" type="datetimeFigureOut">
               <a:rPr lang="en-US" smtClean="0"/>
-              <a:t>3/16/2022</a:t>
+              <a:t>3/23/2022</a:t>
             </a:fld>
             <a:endParaRPr lang="en-US"/>
           </a:p>
@@ -2731,7 +2837,7 @@
           <a:p>
             <a:fld id="{C3F78080-8D0A-4BE8-A5B4-CB115102D524}" type="datetimeFigureOut">
               <a:rPr lang="en-US" smtClean="0"/>
-              <a:t>3/16/2022</a:t>
+              <a:t>3/23/2022</a:t>
             </a:fld>
             <a:endParaRPr lang="en-US"/>
           </a:p>
@@ -2929,7 +3035,7 @@
           <a:p>
             <a:fld id="{C3F78080-8D0A-4BE8-A5B4-CB115102D524}" type="datetimeFigureOut">
               <a:rPr lang="en-US" smtClean="0"/>
-              <a:t>3/16/2022</a:t>
+              <a:t>3/23/2022</a:t>
             </a:fld>
             <a:endParaRPr lang="en-US"/>
           </a:p>
@@ -3204,7 +3310,7 @@
           <a:p>
             <a:fld id="{C3F78080-8D0A-4BE8-A5B4-CB115102D524}" type="datetimeFigureOut">
               <a:rPr lang="en-US" smtClean="0"/>
-              <a:t>3/16/2022</a:t>
+              <a:t>3/23/2022</a:t>
             </a:fld>
             <a:endParaRPr lang="en-US"/>
           </a:p>
@@ -3469,7 +3575,7 @@
           <a:p>
             <a:fld id="{C3F78080-8D0A-4BE8-A5B4-CB115102D524}" type="datetimeFigureOut">
               <a:rPr lang="en-US" smtClean="0"/>
-              <a:t>3/16/2022</a:t>
+              <a:t>3/23/2022</a:t>
             </a:fld>
             <a:endParaRPr lang="en-US"/>
           </a:p>
@@ -3881,7 +3987,7 @@
           <a:p>
             <a:fld id="{C3F78080-8D0A-4BE8-A5B4-CB115102D524}" type="datetimeFigureOut">
               <a:rPr lang="en-US" smtClean="0"/>
-              <a:t>3/16/2022</a:t>
+              <a:t>3/23/2022</a:t>
             </a:fld>
             <a:endParaRPr lang="en-US"/>
           </a:p>
@@ -4022,7 +4128,7 @@
           <a:p>
             <a:fld id="{C3F78080-8D0A-4BE8-A5B4-CB115102D524}" type="datetimeFigureOut">
               <a:rPr lang="en-US" smtClean="0"/>
-              <a:t>3/16/2022</a:t>
+              <a:t>3/23/2022</a:t>
             </a:fld>
             <a:endParaRPr lang="en-US"/>
           </a:p>
@@ -4135,7 +4241,7 @@
           <a:p>
             <a:fld id="{C3F78080-8D0A-4BE8-A5B4-CB115102D524}" type="datetimeFigureOut">
               <a:rPr lang="en-US" smtClean="0"/>
-              <a:t>3/16/2022</a:t>
+              <a:t>3/23/2022</a:t>
             </a:fld>
             <a:endParaRPr lang="en-US"/>
           </a:p>
@@ -4446,7 +4552,7 @@
           <a:p>
             <a:fld id="{C3F78080-8D0A-4BE8-A5B4-CB115102D524}" type="datetimeFigureOut">
               <a:rPr lang="en-US" smtClean="0"/>
-              <a:t>3/16/2022</a:t>
+              <a:t>3/23/2022</a:t>
             </a:fld>
             <a:endParaRPr lang="en-US"/>
           </a:p>
@@ -4734,7 +4840,7 @@
           <a:p>
             <a:fld id="{C3F78080-8D0A-4BE8-A5B4-CB115102D524}" type="datetimeFigureOut">
               <a:rPr lang="en-US" smtClean="0"/>
-              <a:t>3/16/2022</a:t>
+              <a:t>3/23/2022</a:t>
             </a:fld>
             <a:endParaRPr lang="en-US"/>
           </a:p>
@@ -4975,7 +5081,7 @@
           <a:p>
             <a:fld id="{C3F78080-8D0A-4BE8-A5B4-CB115102D524}" type="datetimeFigureOut">
               <a:rPr lang="en-US" smtClean="0"/>
-              <a:t>3/16/2022</a:t>
+              <a:t>3/23/2022</a:t>
             </a:fld>
             <a:endParaRPr lang="en-US"/>
           </a:p>
@@ -5508,38 +5614,176 @@
       </p:grpSpPr>
       <p:pic>
         <p:nvPicPr>
-          <p:cNvPr id="8" name="Picture 7">
-            <a:extLst>
-              <a:ext uri="{FF2B5EF4-FFF2-40B4-BE49-F238E27FC236}">
-                <a16:creationId xmlns:a16="http://schemas.microsoft.com/office/drawing/2014/main" id="{210BE06C-2EAE-40B4-ADC8-21A55DCD1876}"/>
+          <p:cNvPr id="3074" name="Picture 2" descr="F19021">
+            <a:extLst>
+              <a:ext uri="{FF2B5EF4-FFF2-40B4-BE49-F238E27FC236}">
+                <a16:creationId xmlns:a16="http://schemas.microsoft.com/office/drawing/2014/main" id="{7C95925C-868A-4277-9301-BE07B33D090B}"/>
               </a:ext>
             </a:extLst>
           </p:cNvPr>
           <p:cNvPicPr>
-            <a:picLocks noChangeAspect="1"/>
+            <a:picLocks noChangeAspect="1" noChangeArrowheads="1"/>
           </p:cNvPicPr>
           <p:nvPr/>
         </p:nvPicPr>
         <p:blipFill>
-          <a:blip r:embed="rId3"/>
+          <a:blip r:embed="rId3">
+            <a:extLst>
+              <a:ext uri="{28A0092B-C50C-407E-A947-70E740481C1C}">
+                <a14:useLocalDpi xmlns:a14="http://schemas.microsoft.com/office/drawing/2010/main" val="0"/>
+              </a:ext>
+            </a:extLst>
+          </a:blip>
+          <a:srcRect/>
           <a:stretch>
             <a:fillRect/>
           </a:stretch>
         </p:blipFill>
-        <p:spPr>
+        <p:spPr bwMode="auto">
           <a:xfrm>
-            <a:off x="1471612" y="1662112"/>
-            <a:ext cx="9248775" cy="3533775"/>
+            <a:off x="3084512" y="328517"/>
+            <a:ext cx="6022975" cy="6200966"/>
           </a:xfrm>
           <a:prstGeom prst="rect">
             <a:avLst/>
           </a:prstGeom>
+          <a:noFill/>
+          <a:extLst>
+            <a:ext uri="{909E8E84-426E-40DD-AFC4-6F175D3DCCD1}">
+              <a14:hiddenFill xmlns:a14="http://schemas.microsoft.com/office/drawing/2010/main">
+                <a:solidFill>
+                  <a:srgbClr val="FFFFFF"/>
+                </a:solidFill>
+              </a14:hiddenFill>
+            </a:ext>
+          </a:extLst>
         </p:spPr>
       </p:pic>
+      <p:sp>
+        <p:nvSpPr>
+          <p:cNvPr id="3" name="TextBox 2">
+            <a:extLst>
+              <a:ext uri="{FF2B5EF4-FFF2-40B4-BE49-F238E27FC236}">
+                <a16:creationId xmlns:a16="http://schemas.microsoft.com/office/drawing/2014/main" id="{548C18DA-ECDD-4F55-9DAB-7ED4B372EFCE}"/>
+              </a:ext>
+            </a:extLst>
+          </p:cNvPr>
+          <p:cNvSpPr txBox="1"/>
+          <p:nvPr/>
+        </p:nvSpPr>
+        <p:spPr>
+          <a:xfrm>
+            <a:off x="0" y="6550223"/>
+            <a:ext cx="12192000" cy="307777"/>
+          </a:xfrm>
+          <a:prstGeom prst="rect">
+            <a:avLst/>
+          </a:prstGeom>
+          <a:noFill/>
+        </p:spPr>
+        <p:txBody>
+          <a:bodyPr wrap="square" rtlCol="0">
+            <a:spAutoFit/>
+          </a:bodyPr>
+          <a:lstStyle/>
+          <a:p>
+            <a:r>
+              <a:rPr lang="en-US" sz="1400" dirty="0">
+                <a:solidFill>
+                  <a:schemeClr val="tx1">
+                    <a:lumMod val="65000"/>
+                    <a:lumOff val="35000"/>
+                  </a:schemeClr>
+                </a:solidFill>
+                <a:latin typeface="+mj-lt"/>
+                <a:ea typeface="Verdana" panose="020B0604030504040204" pitchFamily="34" charset="0"/>
+              </a:rPr>
+              <a:t>Source: Glassner, A. (2021). </a:t>
+            </a:r>
+            <a:r>
+              <a:rPr lang="en-US" sz="1400" i="1" dirty="0">
+                <a:solidFill>
+                  <a:schemeClr val="tx1">
+                    <a:lumMod val="65000"/>
+                    <a:lumOff val="35000"/>
+                  </a:schemeClr>
+                </a:solidFill>
+                <a:latin typeface="+mj-lt"/>
+                <a:ea typeface="Verdana" panose="020B0604030504040204" pitchFamily="34" charset="0"/>
+              </a:rPr>
+              <a:t>Deep Learning: A Visual Approach</a:t>
+            </a:r>
+            <a:r>
+              <a:rPr lang="en-US" sz="1400" dirty="0">
+                <a:solidFill>
+                  <a:schemeClr val="tx1">
+                    <a:lumMod val="65000"/>
+                    <a:lumOff val="35000"/>
+                  </a:schemeClr>
+                </a:solidFill>
+                <a:latin typeface="+mj-lt"/>
+                <a:ea typeface="Verdana" panose="020B0604030504040204" pitchFamily="34" charset="0"/>
+              </a:rPr>
+              <a:t>. </a:t>
+            </a:r>
+            <a:r>
+              <a:rPr lang="en-US" sz="1400" b="0" i="0" dirty="0">
+                <a:solidFill>
+                  <a:schemeClr val="tx1">
+                    <a:lumMod val="65000"/>
+                    <a:lumOff val="35000"/>
+                  </a:schemeClr>
+                </a:solidFill>
+                <a:effectLst/>
+                <a:latin typeface="+mj-lt"/>
+                <a:ea typeface="Verdana" panose="020B0604030504040204" pitchFamily="34" charset="0"/>
+              </a:rPr>
+              <a:t>San Francisco, CA: </a:t>
+            </a:r>
+            <a:r>
+              <a:rPr lang="en-US" sz="1400" dirty="0">
+                <a:solidFill>
+                  <a:schemeClr val="tx1">
+                    <a:lumMod val="65000"/>
+                    <a:lumOff val="35000"/>
+                  </a:schemeClr>
+                </a:solidFill>
+                <a:latin typeface="+mj-lt"/>
+                <a:ea typeface="Verdana" panose="020B0604030504040204" pitchFamily="34" charset="0"/>
+              </a:rPr>
+              <a:t>No Starch Press</a:t>
+            </a:r>
+            <a:r>
+              <a:rPr lang="en-US" sz="1400" b="0" i="0" dirty="0">
+                <a:solidFill>
+                  <a:schemeClr val="tx1">
+                    <a:lumMod val="65000"/>
+                    <a:lumOff val="35000"/>
+                  </a:schemeClr>
+                </a:solidFill>
+                <a:effectLst/>
+                <a:latin typeface="+mj-lt"/>
+                <a:ea typeface="Verdana" panose="020B0604030504040204" pitchFamily="34" charset="0"/>
+              </a:rPr>
+              <a:t>.  (Chapter 19)</a:t>
+            </a:r>
+            <a:endParaRPr lang="en-US" sz="1400" dirty="0">
+              <a:solidFill>
+                <a:schemeClr val="tx1">
+                  <a:lumMod val="65000"/>
+                  <a:lumOff val="35000"/>
+                </a:schemeClr>
+              </a:solidFill>
+              <a:latin typeface="+mj-lt"/>
+              <a:ea typeface="Verdana" panose="020B0604030504040204" pitchFamily="34" charset="0"/>
+            </a:endParaRPr>
+          </a:p>
+        </p:txBody>
+      </p:sp>
     </p:spTree>
     <p:extLst>
       <p:ext uri="{BB962C8B-B14F-4D97-AF65-F5344CB8AC3E}">
-        <p14:creationId xmlns:p14="http://schemas.microsoft.com/office/powerpoint/2010/main" val="1503611288"/>
+        <p14:creationId xmlns:p14="http://schemas.microsoft.com/office/powerpoint/2010/main" val="3779906102"/>
       </p:ext>
     </p:extLst>
   </p:cSld>
@@ -5878,10 +6122,40 @@
           <a:chExt cx="0" cy="0"/>
         </a:xfrm>
       </p:grpSpPr>
+      <p:pic>
+        <p:nvPicPr>
+          <p:cNvPr id="8" name="Picture 7">
+            <a:extLst>
+              <a:ext uri="{FF2B5EF4-FFF2-40B4-BE49-F238E27FC236}">
+                <a16:creationId xmlns:a16="http://schemas.microsoft.com/office/drawing/2014/main" id="{210BE06C-2EAE-40B4-ADC8-21A55DCD1876}"/>
+              </a:ext>
+            </a:extLst>
+          </p:cNvPr>
+          <p:cNvPicPr>
+            <a:picLocks noChangeAspect="1"/>
+          </p:cNvPicPr>
+          <p:nvPr/>
+        </p:nvPicPr>
+        <p:blipFill>
+          <a:blip r:embed="rId3"/>
+          <a:stretch>
+            <a:fillRect/>
+          </a:stretch>
+        </p:blipFill>
+        <p:spPr>
+          <a:xfrm>
+            <a:off x="1471612" y="1662112"/>
+            <a:ext cx="9248775" cy="3533775"/>
+          </a:xfrm>
+          <a:prstGeom prst="rect">
+            <a:avLst/>
+          </a:prstGeom>
+        </p:spPr>
+      </p:pic>
     </p:spTree>
     <p:extLst>
       <p:ext uri="{BB962C8B-B14F-4D97-AF65-F5344CB8AC3E}">
-        <p14:creationId xmlns:p14="http://schemas.microsoft.com/office/powerpoint/2010/main" val="1844174422"/>
+        <p14:creationId xmlns:p14="http://schemas.microsoft.com/office/powerpoint/2010/main" val="1503611288"/>
       </p:ext>
     </p:extLst>
   </p:cSld>
@@ -5920,6 +6194,48 @@
           <a:chExt cx="0" cy="0"/>
         </a:xfrm>
       </p:grpSpPr>
+    </p:spTree>
+    <p:extLst>
+      <p:ext uri="{BB962C8B-B14F-4D97-AF65-F5344CB8AC3E}">
+        <p14:creationId xmlns:p14="http://schemas.microsoft.com/office/powerpoint/2010/main" val="1844174422"/>
+      </p:ext>
+    </p:extLst>
+  </p:cSld>
+  <p:clrMapOvr>
+    <a:masterClrMapping/>
+  </p:clrMapOvr>
+  <mc:AlternateContent xmlns:mc="http://schemas.openxmlformats.org/markup-compatibility/2006" xmlns:p14="http://schemas.microsoft.com/office/powerpoint/2010/main">
+    <mc:Choice Requires="p14">
+      <p:transition spd="med" p14:dur="700">
+        <p:fade/>
+      </p:transition>
+    </mc:Choice>
+    <mc:Fallback xmlns="">
+      <p:transition spd="med">
+        <p:fade/>
+      </p:transition>
+    </mc:Fallback>
+  </mc:AlternateContent>
+</p:sld>
+</file>
+
+<file path=ppt/slides/slide14.xml><?xml version="1.0" encoding="utf-8"?>
+<p:sld xmlns:a="http://schemas.openxmlformats.org/drawingml/2006/main" xmlns:r="http://schemas.openxmlformats.org/officeDocument/2006/relationships" xmlns:p="http://schemas.openxmlformats.org/presentationml/2006/main">
+  <p:cSld>
+    <p:spTree>
+      <p:nvGrpSpPr>
+        <p:cNvPr id="1" name=""/>
+        <p:cNvGrpSpPr/>
+        <p:nvPr/>
+      </p:nvGrpSpPr>
+      <p:grpSpPr>
+        <a:xfrm>
+          <a:off x="0" y="0"/>
+          <a:ext cx="0" cy="0"/>
+          <a:chOff x="0" y="0"/>
+          <a:chExt cx="0" cy="0"/>
+        </a:xfrm>
+      </p:grpSpPr>
       <p:pic>
         <p:nvPicPr>
           <p:cNvPr id="11266" name="Picture 2" descr="Bidirectional LSTM">
@@ -6046,7 +6362,7 @@
                 <a:latin typeface="+mj-lt"/>
                 <a:ea typeface="Verdana" panose="020B0604030504040204" pitchFamily="34" charset="0"/>
               </a:rPr>
-              <a:t>Sebastopol, CA: O'Reilly Media, Inc.</a:t>
+              <a:t>Sebastopol, CA: O'Reilly Media, Inc (Chapter 7).</a:t>
             </a:r>
             <a:endParaRPr lang="en-US" sz="1400" dirty="0">
               <a:solidFill>
@@ -6143,6 +6459,100 @@
             </a:r>
             <a:endParaRPr lang="en-US" sz="2800" dirty="0">
               <a:latin typeface="Palatino Linotype" panose="02040502050505030304" pitchFamily="18" charset="0"/>
+            </a:endParaRPr>
+          </a:p>
+        </p:txBody>
+      </p:sp>
+      <p:sp>
+        <p:nvSpPr>
+          <p:cNvPr id="3" name="TextBox 2">
+            <a:extLst>
+              <a:ext uri="{FF2B5EF4-FFF2-40B4-BE49-F238E27FC236}">
+                <a16:creationId xmlns:a16="http://schemas.microsoft.com/office/drawing/2014/main" id="{D0F8786A-11B8-4A01-9673-C6C14FA406C3}"/>
+              </a:ext>
+            </a:extLst>
+          </p:cNvPr>
+          <p:cNvSpPr txBox="1"/>
+          <p:nvPr/>
+        </p:nvSpPr>
+        <p:spPr>
+          <a:xfrm>
+            <a:off x="0" y="6550223"/>
+            <a:ext cx="12192000" cy="307777"/>
+          </a:xfrm>
+          <a:prstGeom prst="rect">
+            <a:avLst/>
+          </a:prstGeom>
+          <a:noFill/>
+        </p:spPr>
+        <p:txBody>
+          <a:bodyPr wrap="square" rtlCol="0">
+            <a:spAutoFit/>
+          </a:bodyPr>
+          <a:lstStyle/>
+          <a:p>
+            <a:r>
+              <a:rPr lang="en-US" sz="1400" dirty="0">
+                <a:solidFill>
+                  <a:schemeClr val="tx1">
+                    <a:lumMod val="65000"/>
+                    <a:lumOff val="35000"/>
+                  </a:schemeClr>
+                </a:solidFill>
+                <a:latin typeface="+mj-lt"/>
+                <a:ea typeface="Verdana" panose="020B0604030504040204" pitchFamily="34" charset="0"/>
+              </a:rPr>
+              <a:t>Source: Moroney, L. (2021). </a:t>
+            </a:r>
+            <a:r>
+              <a:rPr lang="en-US" sz="1400" i="1" dirty="0">
+                <a:solidFill>
+                  <a:schemeClr val="tx1">
+                    <a:lumMod val="65000"/>
+                    <a:lumOff val="35000"/>
+                  </a:schemeClr>
+                </a:solidFill>
+                <a:latin typeface="+mj-lt"/>
+                <a:ea typeface="Verdana" panose="020B0604030504040204" pitchFamily="34" charset="0"/>
+              </a:rPr>
+              <a:t>AI and Machine Learning for Coders: A Programmer’s Guide to Artificial Intelligence</a:t>
+            </a:r>
+            <a:r>
+              <a:rPr lang="en-US" sz="1400" dirty="0">
+                <a:solidFill>
+                  <a:schemeClr val="tx1">
+                    <a:lumMod val="65000"/>
+                    <a:lumOff val="35000"/>
+                  </a:schemeClr>
+                </a:solidFill>
+                <a:latin typeface="+mj-lt"/>
+                <a:ea typeface="Verdana" panose="020B0604030504040204" pitchFamily="34" charset="0"/>
+              </a:rPr>
+              <a:t>. </a:t>
+            </a:r>
+            <a:r>
+              <a:rPr lang="en-US" sz="1400" b="0" i="0" dirty="0">
+                <a:solidFill>
+                  <a:schemeClr val="tx1">
+                    <a:lumMod val="65000"/>
+                    <a:lumOff val="35000"/>
+                  </a:schemeClr>
+                </a:solidFill>
+                <a:effectLst/>
+                <a:latin typeface="+mj-lt"/>
+                <a:ea typeface="Verdana" panose="020B0604030504040204" pitchFamily="34" charset="0"/>
+              </a:rPr>
+              <a:t>Sebastopol, CA: O'Reilly Media, Inc.  (Chapter 7)</a:t>
+            </a:r>
+            <a:endParaRPr lang="en-US" sz="1400" dirty="0">
+              <a:solidFill>
+                <a:schemeClr val="tx1">
+                  <a:lumMod val="65000"/>
+                  <a:lumOff val="35000"/>
+                </a:schemeClr>
+              </a:solidFill>
+              <a:latin typeface="+mj-lt"/>
+              <a:ea typeface="Verdana" panose="020B0604030504040204" pitchFamily="34" charset="0"/>
             </a:endParaRPr>
           </a:p>
         </p:txBody>
@@ -6825,7 +7235,7 @@
                 <a:latin typeface="+mj-lt"/>
                 <a:ea typeface="Verdana" panose="020B0604030504040204" pitchFamily="34" charset="0"/>
               </a:rPr>
-              <a:t>Sebastopol, CA: O'Reilly Media, Inc.</a:t>
+              <a:t>Sebastopol, CA: O'Reilly Media, Inc. (Chapter 7)</a:t>
             </a:r>
             <a:endParaRPr lang="en-US" sz="1400" dirty="0">
               <a:solidFill>
@@ -6911,7 +7321,7 @@
         </p:blipFill>
         <p:spPr bwMode="auto">
           <a:xfrm>
-            <a:off x="2405063" y="1138238"/>
+            <a:off x="2405063" y="1522550"/>
             <a:ext cx="7381875" cy="4581525"/>
           </a:xfrm>
           <a:prstGeom prst="rect">
@@ -7047,6 +7457,51 @@
               <a:latin typeface="+mj-lt"/>
               <a:ea typeface="Verdana" panose="020B0604030504040204" pitchFamily="34" charset="0"/>
             </a:endParaRPr>
+          </a:p>
+        </p:txBody>
+      </p:sp>
+      <p:sp>
+        <p:nvSpPr>
+          <p:cNvPr id="4" name="Title 1">
+            <a:extLst>
+              <a:ext uri="{FF2B5EF4-FFF2-40B4-BE49-F238E27FC236}">
+                <a16:creationId xmlns:a16="http://schemas.microsoft.com/office/drawing/2014/main" id="{E3F92B7C-E1A9-4209-85E3-859C668FF64C}"/>
+              </a:ext>
+            </a:extLst>
+          </p:cNvPr>
+          <p:cNvSpPr>
+            <a:spLocks noGrp="1"/>
+          </p:cNvSpPr>
+          <p:nvPr>
+            <p:ph type="title"/>
+          </p:nvPr>
+        </p:nvSpPr>
+        <p:spPr>
+          <a:xfrm>
+            <a:off x="0" y="365127"/>
+            <a:ext cx="12192000" cy="827416"/>
+          </a:xfrm>
+        </p:spPr>
+        <p:txBody>
+          <a:bodyPr>
+            <a:normAutofit/>
+          </a:bodyPr>
+          <a:lstStyle/>
+          <a:p>
+            <a:pPr algn="ctr"/>
+            <a:r>
+              <a:rPr lang="en-US" dirty="0">
+                <a:solidFill>
+                  <a:schemeClr val="tx1">
+                    <a:lumMod val="75000"/>
+                    <a:lumOff val="25000"/>
+                  </a:schemeClr>
+                </a:solidFill>
+                <a:latin typeface="Palatino Linotype" panose="02040502050505030304" pitchFamily="18" charset="0"/>
+                <a:cs typeface="Segoe UI Light" panose="020B0502040204020203" pitchFamily="34" charset="0"/>
+              </a:rPr>
+              <a:t>Stacked LSTM</a:t>
+            </a:r>
           </a:p>
         </p:txBody>
       </p:sp>
@@ -7092,167 +7547,26 @@
           <a:chExt cx="0" cy="0"/>
         </a:xfrm>
       </p:grpSpPr>
-      <p:pic>
-        <p:nvPicPr>
-          <p:cNvPr id="9218" name="Picture 2" descr="High-level view of LSTM bidirectional architecture">
-            <a:extLst>
-              <a:ext uri="{FF2B5EF4-FFF2-40B4-BE49-F238E27FC236}">
-                <a16:creationId xmlns:a16="http://schemas.microsoft.com/office/drawing/2014/main" id="{A97C392D-F7FE-48F9-9916-B1E7BC71913A}"/>
-              </a:ext>
-            </a:extLst>
-          </p:cNvPr>
-          <p:cNvPicPr>
-            <a:picLocks noChangeAspect="1" noChangeArrowheads="1"/>
-          </p:cNvPicPr>
-          <p:nvPr/>
-        </p:nvPicPr>
-        <p:blipFill>
-          <a:blip r:embed="rId3">
-            <a:extLst>
-              <a:ext uri="{28A0092B-C50C-407E-A947-70E740481C1C}">
-                <a14:useLocalDpi xmlns:a14="http://schemas.microsoft.com/office/drawing/2010/main" val="0"/>
-              </a:ext>
-            </a:extLst>
-          </a:blip>
-          <a:srcRect/>
-          <a:stretch>
-            <a:fillRect/>
-          </a:stretch>
-        </p:blipFill>
-        <p:spPr bwMode="auto">
-          <a:xfrm>
-            <a:off x="1624696" y="1748184"/>
-            <a:ext cx="9243453" cy="3474720"/>
-          </a:xfrm>
-          <a:prstGeom prst="rect">
-            <a:avLst/>
-          </a:prstGeom>
-          <a:noFill/>
-          <a:extLst>
-            <a:ext uri="{909E8E84-426E-40DD-AFC4-6F175D3DCCD1}">
-              <a14:hiddenFill xmlns:a14="http://schemas.microsoft.com/office/drawing/2010/main">
-                <a:solidFill>
-                  <a:srgbClr val="FFFFFF"/>
-                </a:solidFill>
-              </a14:hiddenFill>
-            </a:ext>
-          </a:extLst>
-        </p:spPr>
-      </p:pic>
-      <p:sp>
-        <p:nvSpPr>
-          <p:cNvPr id="3" name="TextBox 2">
-            <a:extLst>
-              <a:ext uri="{FF2B5EF4-FFF2-40B4-BE49-F238E27FC236}">
-                <a16:creationId xmlns:a16="http://schemas.microsoft.com/office/drawing/2014/main" id="{4B547D45-8D67-4E8A-8D5D-C004936AFCD5}"/>
-              </a:ext>
-            </a:extLst>
-          </p:cNvPr>
-          <p:cNvSpPr txBox="1"/>
-          <p:nvPr/>
+      <p:sp>
+        <p:nvSpPr>
+          <p:cNvPr id="2" name="Title 1">
+            <a:extLst>
+              <a:ext uri="{FF2B5EF4-FFF2-40B4-BE49-F238E27FC236}">
+                <a16:creationId xmlns:a16="http://schemas.microsoft.com/office/drawing/2014/main" id="{FABF8C6D-AA18-4F67-904A-9DD91F253AA0}"/>
+              </a:ext>
+            </a:extLst>
+          </p:cNvPr>
+          <p:cNvSpPr>
+            <a:spLocks noGrp="1"/>
+          </p:cNvSpPr>
+          <p:nvPr>
+            <p:ph type="title"/>
+          </p:nvPr>
         </p:nvSpPr>
         <p:spPr>
           <a:xfrm>
-            <a:off x="0" y="6550223"/>
-            <a:ext cx="12192000" cy="307777"/>
-          </a:xfrm>
-          <a:prstGeom prst="rect">
-            <a:avLst/>
-          </a:prstGeom>
-          <a:noFill/>
-        </p:spPr>
-        <p:txBody>
-          <a:bodyPr wrap="square" rtlCol="0">
-            <a:spAutoFit/>
-          </a:bodyPr>
-          <a:lstStyle/>
-          <a:p>
-            <a:r>
-              <a:rPr lang="en-US" sz="1400" dirty="0">
-                <a:solidFill>
-                  <a:schemeClr val="tx1">
-                    <a:lumMod val="65000"/>
-                    <a:lumOff val="35000"/>
-                  </a:schemeClr>
-                </a:solidFill>
-                <a:latin typeface="+mj-lt"/>
-                <a:ea typeface="Verdana" panose="020B0604030504040204" pitchFamily="34" charset="0"/>
-              </a:rPr>
-              <a:t>Source: Moroney, L. (2021). </a:t>
-            </a:r>
-            <a:r>
-              <a:rPr lang="en-US" sz="1400" i="1" dirty="0">
-                <a:solidFill>
-                  <a:schemeClr val="tx1">
-                    <a:lumMod val="65000"/>
-                    <a:lumOff val="35000"/>
-                  </a:schemeClr>
-                </a:solidFill>
-                <a:latin typeface="+mj-lt"/>
-                <a:ea typeface="Verdana" panose="020B0604030504040204" pitchFamily="34" charset="0"/>
-              </a:rPr>
-              <a:t>AI and Machine Learning for Coders: A Programmer’s Guide to Artificial Intelligence</a:t>
-            </a:r>
-            <a:r>
-              <a:rPr lang="en-US" sz="1400" dirty="0">
-                <a:solidFill>
-                  <a:schemeClr val="tx1">
-                    <a:lumMod val="65000"/>
-                    <a:lumOff val="35000"/>
-                  </a:schemeClr>
-                </a:solidFill>
-                <a:latin typeface="+mj-lt"/>
-                <a:ea typeface="Verdana" panose="020B0604030504040204" pitchFamily="34" charset="0"/>
-              </a:rPr>
-              <a:t>. </a:t>
-            </a:r>
-            <a:r>
-              <a:rPr lang="en-US" sz="1400" b="0" i="0" dirty="0">
-                <a:solidFill>
-                  <a:schemeClr val="tx1">
-                    <a:lumMod val="65000"/>
-                    <a:lumOff val="35000"/>
-                  </a:schemeClr>
-                </a:solidFill>
-                <a:effectLst/>
-                <a:latin typeface="+mj-lt"/>
-                <a:ea typeface="Verdana" panose="020B0604030504040204" pitchFamily="34" charset="0"/>
-              </a:rPr>
-              <a:t>Sebastopol, CA: O'Reilly Media, Inc.</a:t>
-            </a:r>
-            <a:endParaRPr lang="en-US" sz="1400" dirty="0">
-              <a:solidFill>
-                <a:schemeClr val="tx1">
-                  <a:lumMod val="65000"/>
-                  <a:lumOff val="35000"/>
-                </a:schemeClr>
-              </a:solidFill>
-              <a:latin typeface="+mj-lt"/>
-              <a:ea typeface="Verdana" panose="020B0604030504040204" pitchFamily="34" charset="0"/>
-            </a:endParaRPr>
-          </a:p>
-        </p:txBody>
-      </p:sp>
-      <p:sp>
-        <p:nvSpPr>
-          <p:cNvPr id="4" name="Title 1">
-            <a:extLst>
-              <a:ext uri="{FF2B5EF4-FFF2-40B4-BE49-F238E27FC236}">
-                <a16:creationId xmlns:a16="http://schemas.microsoft.com/office/drawing/2014/main" id="{6CB0850E-9A3C-4054-9A2C-A07FE369E8DC}"/>
-              </a:ext>
-            </a:extLst>
-          </p:cNvPr>
-          <p:cNvSpPr>
-            <a:spLocks noGrp="1"/>
-          </p:cNvSpPr>
-          <p:nvPr>
-            <p:ph type="title"/>
-          </p:nvPr>
-        </p:nvSpPr>
-        <p:spPr>
-          <a:xfrm>
-            <a:off x="0" y="365127"/>
-            <a:ext cx="12191999" cy="827416"/>
+            <a:off x="0" y="3015292"/>
+            <a:ext cx="12192000" cy="827416"/>
           </a:xfrm>
         </p:spPr>
         <p:txBody>
@@ -7273,7 +7587,7 @@
                 <a:latin typeface="Palatino Linotype" panose="02040502050505030304" pitchFamily="18" charset="0"/>
                 <a:cs typeface="Segoe UI Light" panose="020B0502040204020203" pitchFamily="34" charset="0"/>
               </a:rPr>
-              <a:t>Bi-Directional RNNs</a:t>
+              <a:t>Gated Recurrence Units (GRU)</a:t>
             </a:r>
           </a:p>
         </p:txBody>
@@ -7281,7 +7595,7 @@
     </p:spTree>
     <p:extLst>
       <p:ext uri="{BB962C8B-B14F-4D97-AF65-F5344CB8AC3E}">
-        <p14:creationId xmlns:p14="http://schemas.microsoft.com/office/powerpoint/2010/main" val="894471726"/>
+        <p14:creationId xmlns:p14="http://schemas.microsoft.com/office/powerpoint/2010/main" val="777333352"/>
       </p:ext>
     </p:extLst>
   </p:cSld>
@@ -7322,10 +7636,10 @@
       </p:grpSpPr>
       <p:pic>
         <p:nvPicPr>
-          <p:cNvPr id="2050" name="Picture 2" descr="F19020">
-            <a:extLst>
-              <a:ext uri="{FF2B5EF4-FFF2-40B4-BE49-F238E27FC236}">
-                <a16:creationId xmlns:a16="http://schemas.microsoft.com/office/drawing/2014/main" id="{D18993ED-DBEE-4E03-A045-E357D9960ABE}"/>
+          <p:cNvPr id="9218" name="Picture 2" descr="High-level view of LSTM bidirectional architecture">
+            <a:extLst>
+              <a:ext uri="{FF2B5EF4-FFF2-40B4-BE49-F238E27FC236}">
+                <a16:creationId xmlns:a16="http://schemas.microsoft.com/office/drawing/2014/main" id="{A97C392D-F7FE-48F9-9916-B1E7BC71913A}"/>
               </a:ext>
             </a:extLst>
           </p:cNvPr>
@@ -7349,8 +7663,8 @@
         </p:blipFill>
         <p:spPr bwMode="auto">
           <a:xfrm>
-            <a:off x="1313408" y="1542029"/>
-            <a:ext cx="9565184" cy="3773941"/>
+            <a:off x="1624696" y="1748184"/>
+            <a:ext cx="9243453" cy="3474720"/>
           </a:xfrm>
           <a:prstGeom prst="rect">
             <a:avLst/>
@@ -7372,7 +7686,7 @@
           <p:cNvPr id="3" name="TextBox 2">
             <a:extLst>
               <a:ext uri="{FF2B5EF4-FFF2-40B4-BE49-F238E27FC236}">
-                <a16:creationId xmlns:a16="http://schemas.microsoft.com/office/drawing/2014/main" id="{94408299-D197-410B-8F5A-47CF412EA652}"/>
+                <a16:creationId xmlns:a16="http://schemas.microsoft.com/office/drawing/2014/main" id="{4B547D45-8D67-4E8A-8D5D-C004936AFCD5}"/>
               </a:ext>
             </a:extLst>
           </p:cNvPr>
@@ -7406,7 +7720,7 @@
                 <a:latin typeface="+mj-lt"/>
                 <a:ea typeface="Verdana" panose="020B0604030504040204" pitchFamily="34" charset="0"/>
               </a:rPr>
-              <a:t>Source: Glassner, A. (2021). </a:t>
+              <a:t>Source: Moroney, L. (2021). </a:t>
             </a:r>
             <a:r>
               <a:rPr lang="en-US" sz="1400" i="1" dirty="0">
@@ -7419,7 +7733,7 @@
                 <a:latin typeface="+mj-lt"/>
                 <a:ea typeface="Verdana" panose="020B0604030504040204" pitchFamily="34" charset="0"/>
               </a:rPr>
-              <a:t>Deep Learning: A Visual Approach</a:t>
+              <a:t>AI and Machine Learning for Coders: A Programmer’s Guide to Artificial Intelligence</a:t>
             </a:r>
             <a:r>
               <a:rPr lang="en-US" sz="1400" dirty="0">
@@ -7446,34 +7760,7 @@
                 <a:latin typeface="+mj-lt"/>
                 <a:ea typeface="Verdana" panose="020B0604030504040204" pitchFamily="34" charset="0"/>
               </a:rPr>
-              <a:t>San Francisco, CA: </a:t>
-            </a:r>
-            <a:r>
-              <a:rPr lang="en-US" sz="1400" dirty="0">
-                <a:solidFill>
-                  <a:schemeClr val="tx1">
-                    <a:lumMod val="65000"/>
-                    <a:lumOff val="35000"/>
-                  </a:schemeClr>
-                </a:solidFill>
-                <a:latin typeface="+mj-lt"/>
-                <a:ea typeface="Verdana" panose="020B0604030504040204" pitchFamily="34" charset="0"/>
-              </a:rPr>
-              <a:t>No Starch Press</a:t>
-            </a:r>
-            <a:r>
-              <a:rPr lang="en-US" sz="1400" b="0" i="0" dirty="0">
-                <a:solidFill>
-                  <a:schemeClr val="tx1">
-                    <a:lumMod val="65000"/>
-                    <a:lumOff val="35000"/>
-                  </a:schemeClr>
-                </a:solidFill>
-                <a:effectLst/>
-                <a:latin typeface="+mj-lt"/>
-                <a:ea typeface="Verdana" panose="020B0604030504040204" pitchFamily="34" charset="0"/>
-              </a:rPr>
-              <a:t>.  (Chapter 19)</a:t>
+              <a:t>Sebastopol, CA: O'Reilly Media, Inc (Chapter 7).</a:t>
             </a:r>
             <a:endParaRPr lang="en-US" sz="1400" dirty="0">
               <a:solidFill>
@@ -7488,10 +7775,55 @@
           </a:p>
         </p:txBody>
       </p:sp>
+      <p:sp>
+        <p:nvSpPr>
+          <p:cNvPr id="4" name="Title 1">
+            <a:extLst>
+              <a:ext uri="{FF2B5EF4-FFF2-40B4-BE49-F238E27FC236}">
+                <a16:creationId xmlns:a16="http://schemas.microsoft.com/office/drawing/2014/main" id="{6CB0850E-9A3C-4054-9A2C-A07FE369E8DC}"/>
+              </a:ext>
+            </a:extLst>
+          </p:cNvPr>
+          <p:cNvSpPr>
+            <a:spLocks noGrp="1"/>
+          </p:cNvSpPr>
+          <p:nvPr>
+            <p:ph type="title"/>
+          </p:nvPr>
+        </p:nvSpPr>
+        <p:spPr>
+          <a:xfrm>
+            <a:off x="0" y="365127"/>
+            <a:ext cx="12191999" cy="827416"/>
+          </a:xfrm>
+        </p:spPr>
+        <p:txBody>
+          <a:bodyPr>
+            <a:normAutofit/>
+          </a:bodyPr>
+          <a:lstStyle/>
+          <a:p>
+            <a:pPr algn="ctr"/>
+            <a:r>
+              <a:rPr lang="en-US" dirty="0">
+                <a:solidFill>
+                  <a:schemeClr val="tx1">
+                    <a:lumMod val="75000"/>
+                    <a:lumOff val="25000"/>
+                  </a:schemeClr>
+                </a:solidFill>
+                <a:latin typeface="Palatino Linotype" panose="02040502050505030304" pitchFamily="18" charset="0"/>
+                <a:cs typeface="Segoe UI Light" panose="020B0502040204020203" pitchFamily="34" charset="0"/>
+              </a:rPr>
+              <a:t>Bi-Directional LSTM</a:t>
+            </a:r>
+          </a:p>
+        </p:txBody>
+      </p:sp>
     </p:spTree>
     <p:extLst>
       <p:ext uri="{BB962C8B-B14F-4D97-AF65-F5344CB8AC3E}">
-        <p14:creationId xmlns:p14="http://schemas.microsoft.com/office/powerpoint/2010/main" val="4096951535"/>
+        <p14:creationId xmlns:p14="http://schemas.microsoft.com/office/powerpoint/2010/main" val="894471726"/>
       </p:ext>
     </p:extLst>
   </p:cSld>
@@ -7532,10 +7864,10 @@
       </p:grpSpPr>
       <p:pic>
         <p:nvPicPr>
-          <p:cNvPr id="3074" name="Picture 2" descr="F19021">
-            <a:extLst>
-              <a:ext uri="{FF2B5EF4-FFF2-40B4-BE49-F238E27FC236}">
-                <a16:creationId xmlns:a16="http://schemas.microsoft.com/office/drawing/2014/main" id="{7C95925C-868A-4277-9301-BE07B33D090B}"/>
+          <p:cNvPr id="2050" name="Picture 2" descr="F19020">
+            <a:extLst>
+              <a:ext uri="{FF2B5EF4-FFF2-40B4-BE49-F238E27FC236}">
+                <a16:creationId xmlns:a16="http://schemas.microsoft.com/office/drawing/2014/main" id="{D18993ED-DBEE-4E03-A045-E357D9960ABE}"/>
               </a:ext>
             </a:extLst>
           </p:cNvPr>
@@ -7559,8 +7891,8 @@
         </p:blipFill>
         <p:spPr bwMode="auto">
           <a:xfrm>
-            <a:off x="3084512" y="328517"/>
-            <a:ext cx="6022975" cy="6200966"/>
+            <a:off x="1313408" y="1542029"/>
+            <a:ext cx="9565184" cy="3773941"/>
           </a:xfrm>
           <a:prstGeom prst="rect">
             <a:avLst/>
@@ -7582,7 +7914,7 @@
           <p:cNvPr id="3" name="TextBox 2">
             <a:extLst>
               <a:ext uri="{FF2B5EF4-FFF2-40B4-BE49-F238E27FC236}">
-                <a16:creationId xmlns:a16="http://schemas.microsoft.com/office/drawing/2014/main" id="{548C18DA-ECDD-4F55-9DAB-7ED4B372EFCE}"/>
+                <a16:creationId xmlns:a16="http://schemas.microsoft.com/office/drawing/2014/main" id="{94408299-D197-410B-8F5A-47CF412EA652}"/>
               </a:ext>
             </a:extLst>
           </p:cNvPr>
@@ -7701,7 +8033,7 @@
     </p:spTree>
     <p:extLst>
       <p:ext uri="{BB962C8B-B14F-4D97-AF65-F5344CB8AC3E}">
-        <p14:creationId xmlns:p14="http://schemas.microsoft.com/office/powerpoint/2010/main" val="3779906102"/>
+        <p14:creationId xmlns:p14="http://schemas.microsoft.com/office/powerpoint/2010/main" val="4096951535"/>
       </p:ext>
     </p:extLst>
   </p:cSld>

</xml_diff>